<commit_message>
Added asset. alloc + net. amo
</commit_message>
<xml_diff>
--- a/RMarkdown_ASRS.pptx
+++ b/RMarkdown_ASRS.pptx
@@ -23,6 +23,7 @@
     <p:sldId id="271" r:id="rId17"/>
     <p:sldId id="272" r:id="rId18"/>
     <p:sldId id="273" r:id="rId19"/>
+    <p:sldId id="274" r:id="rId20"/>
   </p:sldIdLst>
   <p:sldSz cx="9144000" cy="6858000" type="screen4x3"/>
   <p:notesSz cx="6858000" cy="9144000"/>
@@ -3924,7 +3925,7 @@
       </p:sp>
       <p:graphicFrame xmlns:a="http://schemas.openxmlformats.org/drawingml/2006/main" xmlns:r="http://schemas.openxmlformats.org/officeDocument/2006/relationships" xmlns:p="http://schemas.openxmlformats.org/presentationml/2006/main">
         <p:nvGraphicFramePr>
-          <p:cNvPr id="429515950" name=""/>
+          <p:cNvPr id="557554369" name=""/>
           <p:cNvGraphicFramePr>
             <a:graphicFrameLocks noGrp="true"/>
           </p:cNvGraphicFramePr>
@@ -5630,6 +5631,265 @@
             </a:pPr>
             <a:r>
               <a:rPr/>
+              <a:t>Debt</a:t>
+            </a:r>
+            <a:r>
+              <a:rPr/>
+              <a:t> </a:t>
+            </a:r>
+            <a:r>
+              <a:rPr/>
+              <a:t>Interest</a:t>
+            </a:r>
+            <a:r>
+              <a:rPr/>
+              <a:t> </a:t>
+            </a:r>
+            <a:r>
+              <a:rPr/>
+              <a:t>vs. Unfunded</a:t>
+            </a:r>
+            <a:r>
+              <a:rPr/>
+              <a:t> </a:t>
+            </a:r>
+            <a:r>
+              <a:rPr/>
+              <a:t>Liability</a:t>
+            </a:r>
+            <a:r>
+              <a:rPr/>
+              <a:t> </a:t>
+            </a:r>
+            <a:r>
+              <a:rPr/>
+              <a:t>Payments</a:t>
+            </a:r>
+            <a:r>
+              <a:rPr/>
+              <a:t> </a:t>
+            </a:r>
+            <a:r>
+              <a:rPr/>
+              <a:t>(2001-2021)</a:t>
+            </a:r>
+            <a:r>
+              <a:rPr/>
+              <a:t> </a:t>
+            </a:r>
+            <a:r>
+              <a:rPr/>
+              <a:t>w/</a:t>
+            </a:r>
+            <a:r>
+              <a:rPr/>
+              <a:t> </a:t>
+            </a:r>
+            <a:r>
+              <a:rPr/>
+              <a:t>R</a:t>
+            </a:r>
+            <a:r>
+              <a:rPr/>
+              <a:t> </a:t>
+            </a:r>
+            <a:r>
+              <a:rPr/>
+              <a:t>(w/</a:t>
+            </a:r>
+            <a:r>
+              <a:rPr/>
+              <a:t> </a:t>
+            </a:r>
+            <a:r>
+              <a:rPr/>
+              <a:t>barPlot())</a:t>
+            </a:r>
+          </a:p>
+        </p:txBody>
+      </p:sp>
+      <p:pic>
+        <p:nvPicPr>
+          <p:cNvPr descr="RMarkdown_ASRS_files/figure-pptx/net.amo-1.png" id="0" name="Picture 1"/>
+          <p:cNvPicPr>
+            <a:picLocks noGrp="1" noChangeAspect="1"/>
+          </p:cNvPicPr>
+          <p:nvPr/>
+        </p:nvPicPr>
+        <p:blipFill>
+          <a:blip r:embed="rId2"/>
+          <a:stretch>
+            <a:fillRect/>
+          </a:stretch>
+        </p:blipFill>
+        <p:spPr bwMode="auto">
+          <a:xfrm>
+            <a:off x="1079500" y="1600200"/>
+            <a:ext cx="6985000" cy="4368800"/>
+          </a:xfrm>
+          <a:prstGeom prst="rect">
+            <a:avLst/>
+          </a:prstGeom>
+          <a:noFill/>
+          <a:ln w="9525">
+            <a:noFill/>
+            <a:headEnd/>
+            <a:tailEnd/>
+          </a:ln>
+        </p:spPr>
+      </p:pic>
+      <p:sp>
+        <p:nvSpPr>
+          <p:cNvPr id="1" name="TextBox 3"/>
+          <p:cNvSpPr txBox="1"/>
+          <p:nvPr/>
+        </p:nvSpPr>
+        <p:spPr>
+          <a:xfrm>
+            <a:off x="457200" y="5969000"/>
+            <a:ext cx="8229600" cy="508000"/>
+          </a:xfrm>
+          <a:prstGeom prst="rect">
+            <a:avLst/>
+          </a:prstGeom>
+          <a:noFill/>
+        </p:spPr>
+        <p:txBody>
+          <a:bodyPr/>
+          <a:lstStyle/>
+          <a:p>
+            <a:pPr lvl="0" marL="0" indent="0" algn="ctr">
+              <a:buNone/>
+            </a:pPr>
+            <a:r>
+              <a:rPr/>
+              <a:t>Source:</a:t>
+            </a:r>
+            <a:r>
+              <a:rPr/>
+              <a:t> </a:t>
+            </a:r>
+            <a:r>
+              <a:rPr/>
+              <a:t>Pension</a:t>
+            </a:r>
+            <a:r>
+              <a:rPr/>
+              <a:t> </a:t>
+            </a:r>
+            <a:r>
+              <a:rPr/>
+              <a:t>Integrity</a:t>
+            </a:r>
+            <a:r>
+              <a:rPr/>
+              <a:t> </a:t>
+            </a:r>
+            <a:r>
+              <a:rPr/>
+              <a:t>Project</a:t>
+            </a:r>
+            <a:r>
+              <a:rPr/>
+              <a:t> </a:t>
+            </a:r>
+            <a:r>
+              <a:rPr/>
+              <a:t>analysis</a:t>
+            </a:r>
+            <a:r>
+              <a:rPr/>
+              <a:t> </a:t>
+            </a:r>
+            <a:r>
+              <a:rPr/>
+              <a:t>of</a:t>
+            </a:r>
+            <a:r>
+              <a:rPr/>
+              <a:t> </a:t>
+            </a:r>
+            <a:r>
+              <a:rPr/>
+              <a:t>SCRS</a:t>
+            </a:r>
+            <a:r>
+              <a:rPr/>
+              <a:t> </a:t>
+            </a:r>
+            <a:r>
+              <a:rPr/>
+              <a:t>actuarial</a:t>
+            </a:r>
+            <a:r>
+              <a:rPr/>
+              <a:t> </a:t>
+            </a:r>
+            <a:r>
+              <a:rPr/>
+              <a:t>valuation</a:t>
+            </a:r>
+            <a:r>
+              <a:rPr/>
+              <a:t> </a:t>
+            </a:r>
+            <a:r>
+              <a:rPr/>
+              <a:t>reports.</a:t>
+            </a:r>
+          </a:p>
+        </p:txBody>
+      </p:sp>
+    </p:spTree>
+  </p:cSld>
+</p:sld>
+</file>
+
+<file path=ppt/slides/slide15.xml><?xml version="1.0" encoding="utf-8"?>
+<p:sld xmlns:a="http://schemas.openxmlformats.org/drawingml/2006/main" xmlns:r="http://schemas.openxmlformats.org/officeDocument/2006/relationships" xmlns:p="http://schemas.openxmlformats.org/presentationml/2006/main">
+  <p:cSld>
+    <p:spTree>
+      <p:nvGrpSpPr>
+        <p:cNvPr id="1" name=""/>
+        <p:cNvGrpSpPr/>
+        <p:nvPr/>
+      </p:nvGrpSpPr>
+      <p:grpSpPr>
+        <a:xfrm>
+          <a:off x="0" y="0"/>
+          <a:ext cx="0" cy="0"/>
+          <a:chOff x="0" y="0"/>
+          <a:chExt cx="0" cy="0"/>
+        </a:xfrm>
+      </p:grpSpPr>
+      <p:sp>
+        <p:nvSpPr>
+          <p:cNvPr id="2" name="Title 1"/>
+          <p:cNvSpPr>
+            <a:spLocks noGrp="1"/>
+          </p:cNvSpPr>
+          <p:nvPr>
+            <p:ph type="title" hasCustomPrompt="1"/>
+          </p:nvPr>
+        </p:nvSpPr>
+        <p:spPr>
+          <a:xfrm>
+            <a:off x="457200" y="533400"/>
+            <a:ext cx="7864475" cy="990600"/>
+          </a:xfrm>
+          <a:prstGeom prst="rect">
+            <a:avLst/>
+          </a:prstGeom>
+        </p:spPr>
+        <p:txBody>
+          <a:bodyPr/>
+          <a:lstStyle/>
+          <a:p>
+            <a:pPr lvl="0" marL="0" indent="0">
+              <a:buNone/>
+            </a:pPr>
+            <a:r>
+              <a:rPr/>
               <a:t>Change</a:t>
             </a:r>
             <a:r>
@@ -5844,7 +6104,7 @@
 </p:sld>
 </file>
 
-<file path=ppt/slides/slide15.xml><?xml version="1.0" encoding="utf-8"?>
+<file path=ppt/slides/slide16.xml><?xml version="1.0" encoding="utf-8"?>
 <p:sld xmlns:a="http://schemas.openxmlformats.org/drawingml/2006/main" xmlns:r="http://schemas.openxmlformats.org/officeDocument/2006/relationships" xmlns:p="http://schemas.openxmlformats.org/presentationml/2006/main">
   <p:cSld>
     <p:spTree>
@@ -5990,7 +6250,7 @@
 </p:sld>
 </file>
 
-<file path=ppt/slides/slide16.xml><?xml version="1.0" encoding="utf-8"?>
+<file path=ppt/slides/slide17.xml><?xml version="1.0" encoding="utf-8"?>
 <p:sld xmlns:a="http://schemas.openxmlformats.org/drawingml/2006/main" xmlns:r="http://schemas.openxmlformats.org/officeDocument/2006/relationships" xmlns:p="http://schemas.openxmlformats.org/presentationml/2006/main">
   <p:cSld>
     <p:spTree>
@@ -6144,7 +6404,7 @@
 </p:sld>
 </file>
 
-<file path=ppt/slides/slide17.xml><?xml version="1.0" encoding="utf-8"?>
+<file path=ppt/slides/slide18.xml><?xml version="1.0" encoding="utf-8"?>
 <p:sld xmlns:a="http://schemas.openxmlformats.org/drawingml/2006/main" xmlns:r="http://schemas.openxmlformats.org/officeDocument/2006/relationships" xmlns:p="http://schemas.openxmlformats.org/presentationml/2006/main">
   <p:cSld>
     <p:spTree>
@@ -6265,11 +6525,11 @@
                 <a:latin typeface="Courier"/>
               </a:rPr>
               <a:t>## Response [https://raw.githubusercontent.com/ReasonFoundation/databaseR/master/files/CPI_by_Region_DOL.xlsx]
-##   Date: 2022-01-14 18:55
+##   Date: 2022-01-16 15:30
 ##   Status: 200
 ##   Content-Type: application/octet-stream
 ##   Size: 13.8 kB
-## &lt;ON DISK&gt;  /var/folders/0z/p5zgjmbn6531bgclzwc383500000gn/T//RtmpmjnJI8/file10f072642b498.xlsx</a:t>
+## &lt;ON DISK&gt;  /var/folders/0z/p5zgjmbn6531bgclzwc383500000gn/T//RtmppjLAqS/file62a13a320b4.xlsx</a:t>
             </a:r>
           </a:p>
         </p:txBody>
@@ -6279,7 +6539,7 @@
 </p:sld>
 </file>
 
-<file path=ppt/slides/slide18.xml><?xml version="1.0" encoding="utf-8"?>
+<file path=ppt/slides/slide19.xml><?xml version="1.0" encoding="utf-8"?>
 <p:sld xmlns:a="http://schemas.openxmlformats.org/drawingml/2006/main" xmlns:r="http://schemas.openxmlformats.org/officeDocument/2006/relationships" xmlns:p="http://schemas.openxmlformats.org/presentationml/2006/main">
   <p:cSld>
     <p:spTree>
@@ -7787,7 +8047,7 @@
       </p:sp>
       <p:graphicFrame xmlns:a="http://schemas.openxmlformats.org/drawingml/2006/main" xmlns:r="http://schemas.openxmlformats.org/officeDocument/2006/relationships" xmlns:p="http://schemas.openxmlformats.org/presentationml/2006/main">
         <p:nvGraphicFramePr>
-          <p:cNvPr id="47368759" name=""/>
+          <p:cNvPr id="51307118" name=""/>
           <p:cNvGraphicFramePr>
             <a:graphicFrameLocks noGrp="true"/>
           </p:cNvGraphicFramePr>

</xml_diff>